<commit_message>
simplified and clarified algorithm description
</commit_message>
<xml_diff>
--- a/PiWi.pptx
+++ b/PiWi.pptx
@@ -303,7 +303,7 @@
           <a:p>
             <a:fld id="{EC01FFC2-8798-D243-B978-07080977D0C0}" type="datetimeFigureOut">
               <a:rPr lang="en-US" smtClean="0"/>
-              <a:t>12/4/18</a:t>
+              <a:t>12/13/18</a:t>
             </a:fld>
             <a:endParaRPr lang="en-US"/>
           </a:p>
@@ -471,7 +471,7 @@
           <a:p>
             <a:fld id="{EC01FFC2-8798-D243-B978-07080977D0C0}" type="datetimeFigureOut">
               <a:rPr lang="en-US" smtClean="0"/>
-              <a:t>12/4/18</a:t>
+              <a:t>12/13/18</a:t>
             </a:fld>
             <a:endParaRPr lang="en-US"/>
           </a:p>
@@ -649,7 +649,7 @@
           <a:p>
             <a:fld id="{EC01FFC2-8798-D243-B978-07080977D0C0}" type="datetimeFigureOut">
               <a:rPr lang="en-US" smtClean="0"/>
-              <a:t>12/4/18</a:t>
+              <a:t>12/13/18</a:t>
             </a:fld>
             <a:endParaRPr lang="en-US"/>
           </a:p>
@@ -817,7 +817,7 @@
           <a:p>
             <a:fld id="{EC01FFC2-8798-D243-B978-07080977D0C0}" type="datetimeFigureOut">
               <a:rPr lang="en-US" smtClean="0"/>
-              <a:t>12/4/18</a:t>
+              <a:t>12/13/18</a:t>
             </a:fld>
             <a:endParaRPr lang="en-US"/>
           </a:p>
@@ -1062,7 +1062,7 @@
           <a:p>
             <a:fld id="{EC01FFC2-8798-D243-B978-07080977D0C0}" type="datetimeFigureOut">
               <a:rPr lang="en-US" smtClean="0"/>
-              <a:t>12/4/18</a:t>
+              <a:t>12/13/18</a:t>
             </a:fld>
             <a:endParaRPr lang="en-US"/>
           </a:p>
@@ -1347,7 +1347,7 @@
           <a:p>
             <a:fld id="{EC01FFC2-8798-D243-B978-07080977D0C0}" type="datetimeFigureOut">
               <a:rPr lang="en-US" smtClean="0"/>
-              <a:t>12/4/18</a:t>
+              <a:t>12/13/18</a:t>
             </a:fld>
             <a:endParaRPr lang="en-US"/>
           </a:p>
@@ -1766,7 +1766,7 @@
           <a:p>
             <a:fld id="{EC01FFC2-8798-D243-B978-07080977D0C0}" type="datetimeFigureOut">
               <a:rPr lang="en-US" smtClean="0"/>
-              <a:t>12/4/18</a:t>
+              <a:t>12/13/18</a:t>
             </a:fld>
             <a:endParaRPr lang="en-US"/>
           </a:p>
@@ -1883,7 +1883,7 @@
           <a:p>
             <a:fld id="{EC01FFC2-8798-D243-B978-07080977D0C0}" type="datetimeFigureOut">
               <a:rPr lang="en-US" smtClean="0"/>
-              <a:t>12/4/18</a:t>
+              <a:t>12/13/18</a:t>
             </a:fld>
             <a:endParaRPr lang="en-US"/>
           </a:p>
@@ -1978,7 +1978,7 @@
           <a:p>
             <a:fld id="{EC01FFC2-8798-D243-B978-07080977D0C0}" type="datetimeFigureOut">
               <a:rPr lang="en-US" smtClean="0"/>
-              <a:t>12/4/18</a:t>
+              <a:t>12/13/18</a:t>
             </a:fld>
             <a:endParaRPr lang="en-US"/>
           </a:p>
@@ -2253,7 +2253,7 @@
           <a:p>
             <a:fld id="{EC01FFC2-8798-D243-B978-07080977D0C0}" type="datetimeFigureOut">
               <a:rPr lang="en-US" smtClean="0"/>
-              <a:t>12/4/18</a:t>
+              <a:t>12/13/18</a:t>
             </a:fld>
             <a:endParaRPr lang="en-US"/>
           </a:p>
@@ -2505,7 +2505,7 @@
           <a:p>
             <a:fld id="{EC01FFC2-8798-D243-B978-07080977D0C0}" type="datetimeFigureOut">
               <a:rPr lang="en-US" smtClean="0"/>
-              <a:t>12/4/18</a:t>
+              <a:t>12/13/18</a:t>
             </a:fld>
             <a:endParaRPr lang="en-US"/>
           </a:p>
@@ -2716,7 +2716,7 @@
           <a:p>
             <a:fld id="{EC01FFC2-8798-D243-B978-07080977D0C0}" type="datetimeFigureOut">
               <a:rPr lang="en-US" smtClean="0"/>
-              <a:t>12/4/18</a:t>
+              <a:t>12/13/18</a:t>
             </a:fld>
             <a:endParaRPr lang="en-US"/>
           </a:p>
@@ -3093,66 +3093,20 @@
       </p:grpSpPr>
       <p:sp>
         <p:nvSpPr>
-          <p:cNvPr id="90" name="Rounded Rectangle 89"/>
+          <p:cNvPr id="56" name="Rounded Rectangle 55">
+            <a:extLst>
+              <a:ext uri="{FF2B5EF4-FFF2-40B4-BE49-F238E27FC236}">
+                <a16:creationId xmlns:a16="http://schemas.microsoft.com/office/drawing/2014/main" id="{F7054A78-52C3-E84C-BCC3-0D0FF53036E0}"/>
+              </a:ext>
+            </a:extLst>
+          </p:cNvPr>
           <p:cNvSpPr/>
           <p:nvPr/>
         </p:nvSpPr>
         <p:spPr>
           <a:xfrm>
-            <a:off x="2630670" y="1896672"/>
-            <a:ext cx="1733982" cy="1062421"/>
-          </a:xfrm>
-          <a:prstGeom prst="roundRect">
-            <a:avLst/>
-          </a:prstGeom>
-          <a:noFill/>
-          <a:ln w="19050" cmpd="sng">
-            <a:solidFill>
-              <a:srgbClr val="000000"/>
-            </a:solidFill>
-          </a:ln>
-          <a:effectLst/>
-        </p:spPr>
-        <p:style>
-          <a:lnRef idx="1">
-            <a:schemeClr val="accent1"/>
-          </a:lnRef>
-          <a:fillRef idx="3">
-            <a:schemeClr val="accent1"/>
-          </a:fillRef>
-          <a:effectRef idx="2">
-            <a:schemeClr val="accent1"/>
-          </a:effectRef>
-          <a:fontRef idx="minor">
-            <a:schemeClr val="lt1"/>
-          </a:fontRef>
-        </p:style>
-        <p:txBody>
-          <a:bodyPr lIns="182880" tIns="0" rIns="182880" bIns="91440" rtlCol="0" anchor="t" anchorCtr="0"/>
-          <a:lstStyle/>
-          <a:p>
-            <a:pPr algn="ctr"/>
-            <a:r>
-              <a:rPr lang="en-US" sz="3200" dirty="0">
-                <a:solidFill>
-                  <a:schemeClr val="tx1"/>
-                </a:solidFill>
-              </a:rPr>
-              <a:t>chunk</a:t>
-            </a:r>
-          </a:p>
-        </p:txBody>
-      </p:sp>
-      <p:sp>
-        <p:nvSpPr>
-          <p:cNvPr id="93" name="Rounded Rectangle 92"/>
-          <p:cNvSpPr/>
-          <p:nvPr/>
-        </p:nvSpPr>
-        <p:spPr>
-          <a:xfrm>
-            <a:off x="2758688" y="436943"/>
-            <a:ext cx="2561998" cy="884991"/>
+            <a:off x="5753898" y="445122"/>
+            <a:ext cx="4304502" cy="1350178"/>
           </a:xfrm>
           <a:prstGeom prst="roundRect">
             <a:avLst/>
@@ -3184,6 +3138,7 @@
             <a:lin ang="16200000" scaled="1"/>
             <a:tileRect/>
           </a:gradFill>
+          <a:ln w="12700"/>
           <a:effectLst/>
         </p:spPr>
         <p:style>
@@ -3205,6 +3160,129 @@
           <a:lstStyle/>
           <a:p>
             <a:pPr algn="ctr"/>
+            <a:endParaRPr lang="en-US" sz="3200" dirty="0"/>
+          </a:p>
+          <a:p>
+            <a:pPr algn="ctr"/>
+            <a:endParaRPr lang="en-US" sz="3200" dirty="0"/>
+          </a:p>
+        </p:txBody>
+      </p:sp>
+      <p:sp>
+        <p:nvSpPr>
+          <p:cNvPr id="90" name="Rounded Rectangle 89"/>
+          <p:cNvSpPr/>
+          <p:nvPr/>
+        </p:nvSpPr>
+        <p:spPr>
+          <a:xfrm>
+            <a:off x="2630670" y="2227956"/>
+            <a:ext cx="1475220" cy="498667"/>
+          </a:xfrm>
+          <a:prstGeom prst="roundRect">
+            <a:avLst/>
+          </a:prstGeom>
+          <a:noFill/>
+          <a:ln w="12700" cmpd="sng">
+            <a:solidFill>
+              <a:srgbClr val="000000"/>
+            </a:solidFill>
+          </a:ln>
+          <a:effectLst/>
+        </p:spPr>
+        <p:style>
+          <a:lnRef idx="1">
+            <a:schemeClr val="accent1"/>
+          </a:lnRef>
+          <a:fillRef idx="3">
+            <a:schemeClr val="accent1"/>
+          </a:fillRef>
+          <a:effectRef idx="2">
+            <a:schemeClr val="accent1"/>
+          </a:effectRef>
+          <a:fontRef idx="minor">
+            <a:schemeClr val="lt1"/>
+          </a:fontRef>
+        </p:style>
+        <p:txBody>
+          <a:bodyPr lIns="182880" tIns="0" rIns="182880" bIns="91440" rtlCol="0" anchor="t" anchorCtr="0"/>
+          <a:lstStyle/>
+          <a:p>
+            <a:pPr algn="ctr"/>
+            <a:r>
+              <a:rPr lang="en-US" sz="3200" dirty="0">
+                <a:solidFill>
+                  <a:schemeClr val="tx1"/>
+                </a:solidFill>
+              </a:rPr>
+              <a:t>chunk</a:t>
+            </a:r>
+          </a:p>
+        </p:txBody>
+      </p:sp>
+      <p:sp>
+        <p:nvSpPr>
+          <p:cNvPr id="93" name="Rounded Rectangle 92"/>
+          <p:cNvSpPr/>
+          <p:nvPr/>
+        </p:nvSpPr>
+        <p:spPr>
+          <a:xfrm>
+            <a:off x="2758688" y="436943"/>
+            <a:ext cx="2561998" cy="1083521"/>
+          </a:xfrm>
+          <a:prstGeom prst="roundRect">
+            <a:avLst/>
+          </a:prstGeom>
+          <a:gradFill flip="none" rotWithShape="1">
+            <a:gsLst>
+              <a:gs pos="0">
+                <a:schemeClr val="dk1">
+                  <a:tint val="50000"/>
+                  <a:satMod val="300000"/>
+                  <a:alpha val="0"/>
+                </a:schemeClr>
+              </a:gs>
+              <a:gs pos="35000">
+                <a:schemeClr val="dk1">
+                  <a:tint val="37000"/>
+                  <a:satMod val="300000"/>
+                  <a:alpha val="0"/>
+                </a:schemeClr>
+              </a:gs>
+              <a:gs pos="100000">
+                <a:schemeClr val="dk1">
+                  <a:tint val="15000"/>
+                  <a:satMod val="350000"/>
+                  <a:alpha val="0"/>
+                </a:schemeClr>
+              </a:gs>
+            </a:gsLst>
+            <a:lin ang="16200000" scaled="1"/>
+            <a:tileRect/>
+          </a:gradFill>
+          <a:ln w="12700"/>
+          <a:effectLst/>
+        </p:spPr>
+        <p:style>
+          <a:lnRef idx="1">
+            <a:schemeClr val="dk1"/>
+          </a:lnRef>
+          <a:fillRef idx="2">
+            <a:schemeClr val="dk1"/>
+          </a:fillRef>
+          <a:effectRef idx="1">
+            <a:schemeClr val="dk1"/>
+          </a:effectRef>
+          <a:fontRef idx="minor">
+            <a:schemeClr val="dk1"/>
+          </a:fontRef>
+        </p:style>
+        <p:txBody>
+          <a:bodyPr lIns="182880" tIns="457200" rIns="182880" bIns="91440" rtlCol="0" anchor="ctr" anchorCtr="1"/>
+          <a:lstStyle/>
+          <a:p>
+            <a:pPr algn="ctr"/>
             <a:r>
               <a:rPr lang="en-US" sz="3200" dirty="0"/>
               <a:t>index</a:t>
@@ -3227,13 +3305,13 @@
         </p:nvCxnSpPr>
         <p:spPr>
           <a:xfrm>
-            <a:off x="4364652" y="2427883"/>
-            <a:ext cx="363118" cy="0"/>
+            <a:off x="4105890" y="2477290"/>
+            <a:ext cx="381050" cy="0"/>
           </a:xfrm>
           <a:prstGeom prst="straightConnector1">
             <a:avLst/>
           </a:prstGeom>
-          <a:ln w="28575" cmpd="sng">
+          <a:ln w="12700" cmpd="sng">
             <a:solidFill>
               <a:srgbClr val="7F7F7F"/>
             </a:solidFill>
@@ -3262,18 +3340,19 @@
           <p:cNvPr id="99" name="Straight Arrow Connector 98"/>
           <p:cNvCxnSpPr>
             <a:cxnSpLocks/>
+            <a:stCxn id="70" idx="3"/>
           </p:cNvCxnSpPr>
           <p:nvPr/>
         </p:nvCxnSpPr>
         <p:spPr>
-          <a:xfrm flipV="1">
-            <a:off x="7670129" y="2417896"/>
-            <a:ext cx="477259" cy="3748"/>
+          <a:xfrm>
+            <a:off x="7409293" y="2452011"/>
+            <a:ext cx="493544" cy="10090"/>
           </a:xfrm>
           <a:prstGeom prst="straightConnector1">
             <a:avLst/>
           </a:prstGeom>
-          <a:ln w="28575" cmpd="sng">
+          <a:ln w="12700" cmpd="sng">
             <a:solidFill>
               <a:srgbClr val="7F7F7F"/>
             </a:solidFill>
@@ -3306,14 +3385,14 @@
           <p:nvPr>
             <p:extLst>
               <p:ext uri="{D42A27DB-BD31-4B8C-83A1-F6EECF244321}">
-                <p14:modId xmlns:p14="http://schemas.microsoft.com/office/powerpoint/2010/main" val="4096807072"/>
+                <p14:modId xmlns:p14="http://schemas.microsoft.com/office/powerpoint/2010/main" val="3017343331"/>
               </p:ext>
             </p:extLst>
           </p:nvPr>
         </p:nvGraphicFramePr>
         <p:xfrm>
-          <a:off x="5834314" y="830508"/>
-          <a:ext cx="4137187" cy="457200"/>
+          <a:off x="5855580" y="883673"/>
+          <a:ext cx="4092125" cy="822960"/>
         </p:xfrm>
         <a:graphic>
           <a:graphicData uri="http://schemas.openxmlformats.org/drawingml/2006/table">
@@ -3322,28 +3401,28 @@
                 <a:tableStyleId>{2D5ABB26-0587-4C30-8999-92F81FD0307C}</a:tableStyleId>
               </a:tblPr>
               <a:tblGrid>
-                <a:gridCol w="982788">
+                <a:gridCol w="740429">
                   <a:extLst>
                     <a:ext uri="{9D8B030D-6E8A-4147-A177-3AD203B41FA5}">
                       <a16:colId xmlns:a16="http://schemas.microsoft.com/office/drawing/2014/main" val="20000"/>
                     </a:ext>
                   </a:extLst>
                 </a:gridCol>
-                <a:gridCol w="731786">
+                <a:gridCol w="1665434">
                   <a:extLst>
                     <a:ext uri="{9D8B030D-6E8A-4147-A177-3AD203B41FA5}">
                       <a16:colId xmlns:a16="http://schemas.microsoft.com/office/drawing/2014/main" val="20001"/>
                     </a:ext>
                   </a:extLst>
                 </a:gridCol>
-                <a:gridCol w="782086">
+                <a:gridCol w="1116473">
                   <a:extLst>
                     <a:ext uri="{9D8B030D-6E8A-4147-A177-3AD203B41FA5}">
                       <a16:colId xmlns:a16="http://schemas.microsoft.com/office/drawing/2014/main" val="20002"/>
                     </a:ext>
                   </a:extLst>
                 </a:gridCol>
-                <a:gridCol w="1640527">
+                <a:gridCol w="569789">
                   <a:extLst>
                     <a:ext uri="{9D8B030D-6E8A-4147-A177-3AD203B41FA5}">
                       <a16:colId xmlns:a16="http://schemas.microsoft.com/office/drawing/2014/main" val="20003"/>
@@ -3360,7 +3439,7 @@
                       <a:pPr algn="ctr"/>
                       <a:r>
                         <a:rPr lang="en-US" sz="2400" b="0" dirty="0"/>
-                        <a:t>none</a:t>
+                        <a:t>⏊</a:t>
                       </a:r>
                     </a:p>
                   </a:txBody>
@@ -3414,8 +3493,25 @@
                       <a:pPr algn="ctr"/>
                       <a:r>
                         <a:rPr lang="en-US" sz="2400" b="0" dirty="0"/>
-                        <a:t>3</a:t>
+                        <a:t>scan k</a:t>
                       </a:r>
+                      <a:r>
+                        <a:rPr lang="en-US" sz="2400" b="0" baseline="-25000" dirty="0"/>
+                        <a:t>1</a:t>
+                      </a:r>
+                      <a:r>
+                        <a:rPr lang="en-US" sz="2400" b="0" dirty="0"/>
+                        <a:t>-k</a:t>
+                      </a:r>
+                      <a:r>
+                        <a:rPr lang="en-US" sz="2400" b="0" baseline="-25000" dirty="0"/>
+                        <a:t>n </a:t>
+                      </a:r>
+                      <a:r>
+                        <a:rPr lang="en-US" sz="2400" b="0" dirty="0"/>
+                        <a:t>version</a:t>
+                      </a:r>
+                      <a:endParaRPr lang="en-US" sz="2400" b="0" baseline="-25000" dirty="0"/>
                     </a:p>
                   </a:txBody>
                   <a:tcPr marL="100584" marR="100584">
@@ -3468,7 +3564,7 @@
                       <a:pPr algn="ctr"/>
                       <a:r>
                         <a:rPr lang="en-US" sz="2400" b="0" dirty="0"/>
-                        <a:t>4</a:t>
+                        <a:t>put k version</a:t>
                       </a:r>
                     </a:p>
                   </a:txBody>
@@ -3586,14 +3682,14 @@
         </p:nvSpPr>
         <p:spPr>
           <a:xfrm>
-            <a:off x="7990668" y="2869366"/>
-            <a:ext cx="2922326" cy="1282152"/>
+            <a:off x="7536834" y="2871827"/>
+            <a:ext cx="1733982" cy="1028552"/>
           </a:xfrm>
           <a:prstGeom prst="roundRect">
             <a:avLst/>
           </a:prstGeom>
           <a:noFill/>
-          <a:ln w="19050" cmpd="sng">
+          <a:ln w="12700" cmpd="sng">
             <a:solidFill>
               <a:srgbClr val="000000"/>
             </a:solidFill>
@@ -3616,15 +3712,19 @@
           </a:fontRef>
         </p:style>
         <p:txBody>
-          <a:bodyPr lIns="182880" tIns="0" rIns="182880" bIns="91440" rtlCol="0" anchor="t" anchorCtr="1"/>
+          <a:bodyPr lIns="182880" tIns="0" rIns="182880" bIns="91440" rtlCol="0" anchor="ctr" anchorCtr="0"/>
           <a:lstStyle/>
           <a:p>
             <a:pPr algn="ctr"/>
-            <a:endParaRPr lang="en-US" sz="3200" dirty="0">
-              <a:solidFill>
-                <a:schemeClr val="tx1"/>
-              </a:solidFill>
-            </a:endParaRPr>
+            <a:r>
+              <a:rPr lang="en-US" sz="3200" dirty="0" err="1">
+                <a:solidFill>
+                  <a:prstClr val="black"/>
+                </a:solidFill>
+              </a:rPr>
+              <a:t>munk</a:t>
+            </a:r>
+            <a:endParaRPr lang="en-US" sz="3200" dirty="0"/>
           </a:p>
         </p:txBody>
       </p:sp>
@@ -3633,18 +3733,19 @@
           <p:cNvPr id="109" name="Straight Arrow Connector 108"/>
           <p:cNvCxnSpPr>
             <a:cxnSpLocks/>
+            <a:endCxn id="108" idx="1"/>
           </p:cNvCxnSpPr>
           <p:nvPr/>
         </p:nvCxnSpPr>
         <p:spPr>
           <a:xfrm>
-            <a:off x="7667783" y="2780688"/>
-            <a:ext cx="322885" cy="215695"/>
+            <a:off x="6879265" y="2709989"/>
+            <a:ext cx="657569" cy="676114"/>
           </a:xfrm>
           <a:prstGeom prst="straightConnector1">
             <a:avLst/>
           </a:prstGeom>
-          <a:ln w="28575" cmpd="sng">
+          <a:ln w="12700" cmpd="sng">
             <a:solidFill>
               <a:srgbClr val="7F7F7F"/>
             </a:solidFill>
@@ -3676,7 +3777,7 @@
         </p:nvSpPr>
         <p:spPr>
           <a:xfrm>
-            <a:off x="5779938" y="122887"/>
+            <a:off x="5875635" y="218584"/>
             <a:ext cx="4146501" cy="571072"/>
           </a:xfrm>
           <a:prstGeom prst="roundRect">
@@ -3709,7 +3810,7 @@
             <a:lin ang="16200000" scaled="1"/>
             <a:tileRect/>
           </a:gradFill>
-          <a:ln>
+          <a:ln w="12700">
             <a:noFill/>
           </a:ln>
           <a:effectLst/>
@@ -3739,7 +3840,7 @@
             </a:pPr>
             <a:r>
               <a:rPr lang="en-US" sz="2800" dirty="0"/>
-              <a:t>PSA (pending scan array)</a:t>
+              <a:t>PO (pending operations)</a:t>
             </a:r>
             <a:endParaRPr lang="en-US" b="1" dirty="0"/>
           </a:p>
@@ -3760,9 +3861,11 @@
             <a:avLst/>
           </a:prstGeom>
           <a:noFill/>
-          <a:ln w="19050" cmpd="sng">
+          <a:ln w="12700" cmpd="sng">
             <a:solidFill>
-              <a:srgbClr val="7F7F7F"/>
+              <a:schemeClr val="bg1">
+                <a:lumMod val="65000"/>
+              </a:schemeClr>
             </a:solidFill>
           </a:ln>
           <a:effectLst/>
@@ -3817,9 +3920,11 @@
             <a:avLst/>
           </a:prstGeom>
           <a:noFill/>
-          <a:ln w="19050" cmpd="sng">
+          <a:ln w="12700" cmpd="sng">
             <a:solidFill>
-              <a:srgbClr val="7F7F7F"/>
+              <a:schemeClr val="bg1">
+                <a:lumMod val="65000"/>
+              </a:schemeClr>
             </a:solidFill>
           </a:ln>
           <a:effectLst/>
@@ -3861,154 +3966,6 @@
       </p:sp>
       <p:sp>
         <p:nvSpPr>
-          <p:cNvPr id="125" name="Rounded Rectangle 124"/>
-          <p:cNvSpPr/>
-          <p:nvPr/>
-        </p:nvSpPr>
-        <p:spPr>
-          <a:xfrm>
-            <a:off x="9145844" y="2977924"/>
-            <a:ext cx="1607144" cy="457200"/>
-          </a:xfrm>
-          <a:prstGeom prst="roundRect">
-            <a:avLst/>
-          </a:prstGeom>
-          <a:noFill/>
-          <a:ln w="19050" cmpd="sng">
-            <a:solidFill>
-              <a:srgbClr val="7F7F7F"/>
-            </a:solidFill>
-          </a:ln>
-          <a:effectLst/>
-        </p:spPr>
-        <p:style>
-          <a:lnRef idx="1">
-            <a:schemeClr val="accent1"/>
-          </a:lnRef>
-          <a:fillRef idx="3">
-            <a:schemeClr val="accent1"/>
-          </a:fillRef>
-          <a:effectRef idx="2">
-            <a:schemeClr val="accent1"/>
-          </a:effectRef>
-          <a:fontRef idx="minor">
-            <a:schemeClr val="lt1"/>
-          </a:fontRef>
-        </p:style>
-        <p:txBody>
-          <a:bodyPr lIns="182880" tIns="0" rIns="182880" bIns="91440" rtlCol="0" anchor="ctr" anchorCtr="1"/>
-          <a:lstStyle/>
-          <a:p>
-            <a:pPr algn="ctr"/>
-            <a:r>
-              <a:rPr lang="en-US" sz="3200" dirty="0" err="1">
-                <a:solidFill>
-                  <a:schemeClr val="tx1"/>
-                </a:solidFill>
-              </a:rPr>
-              <a:t>karray</a:t>
-            </a:r>
-            <a:endParaRPr lang="en-US" sz="3200" dirty="0">
-              <a:solidFill>
-                <a:schemeClr val="tx1"/>
-              </a:solidFill>
-            </a:endParaRPr>
-          </a:p>
-        </p:txBody>
-      </p:sp>
-      <p:sp>
-        <p:nvSpPr>
-          <p:cNvPr id="126" name="Rounded Rectangle 125"/>
-          <p:cNvSpPr/>
-          <p:nvPr/>
-        </p:nvSpPr>
-        <p:spPr>
-          <a:xfrm>
-            <a:off x="9145844" y="3587524"/>
-            <a:ext cx="1607144" cy="457200"/>
-          </a:xfrm>
-          <a:prstGeom prst="roundRect">
-            <a:avLst/>
-          </a:prstGeom>
-          <a:noFill/>
-          <a:ln w="19050" cmpd="sng">
-            <a:solidFill>
-              <a:srgbClr val="7F7F7F"/>
-            </a:solidFill>
-          </a:ln>
-          <a:effectLst/>
-        </p:spPr>
-        <p:style>
-          <a:lnRef idx="1">
-            <a:schemeClr val="accent1"/>
-          </a:lnRef>
-          <a:fillRef idx="3">
-            <a:schemeClr val="accent1"/>
-          </a:fillRef>
-          <a:effectRef idx="2">
-            <a:schemeClr val="accent1"/>
-          </a:effectRef>
-          <a:fontRef idx="minor">
-            <a:schemeClr val="lt1"/>
-          </a:fontRef>
-        </p:style>
-        <p:txBody>
-          <a:bodyPr lIns="182880" tIns="0" rIns="182880" bIns="91440" rtlCol="0" anchor="ctr" anchorCtr="1"/>
-          <a:lstStyle/>
-          <a:p>
-            <a:pPr algn="ctr"/>
-            <a:r>
-              <a:rPr lang="en-US" sz="3200" dirty="0" err="1">
-                <a:solidFill>
-                  <a:schemeClr val="tx1"/>
-                </a:solidFill>
-              </a:rPr>
-              <a:t>varray</a:t>
-            </a:r>
-            <a:endParaRPr lang="en-US" sz="3200" dirty="0">
-              <a:solidFill>
-                <a:schemeClr val="tx1"/>
-              </a:solidFill>
-            </a:endParaRPr>
-          </a:p>
-        </p:txBody>
-      </p:sp>
-      <p:sp>
-        <p:nvSpPr>
-          <p:cNvPr id="127" name="Rectangle 126"/>
-          <p:cNvSpPr/>
-          <p:nvPr/>
-        </p:nvSpPr>
-        <p:spPr>
-          <a:xfrm rot="16200000">
-            <a:off x="7027965" y="3218055"/>
-            <a:ext cx="1282152" cy="584776"/>
-          </a:xfrm>
-          <a:prstGeom prst="rect">
-            <a:avLst/>
-          </a:prstGeom>
-        </p:spPr>
-        <p:txBody>
-          <a:bodyPr wrap="square">
-            <a:spAutoFit/>
-          </a:bodyPr>
-          <a:lstStyle/>
-          <a:p>
-            <a:pPr algn="ctr"/>
-            <a:r>
-              <a:rPr lang="en-US" sz="3200" dirty="0" err="1">
-                <a:solidFill>
-                  <a:prstClr val="black"/>
-                </a:solidFill>
-              </a:rPr>
-              <a:t>munk</a:t>
-            </a:r>
-            <a:endParaRPr lang="en-US" dirty="0"/>
-          </a:p>
-        </p:txBody>
-      </p:sp>
-      <p:sp>
-        <p:nvSpPr>
           <p:cNvPr id="141" name="Rounded Rectangle 140"/>
           <p:cNvSpPr/>
           <p:nvPr/>
@@ -4022,7 +3979,7 @@
             <a:avLst/>
           </a:prstGeom>
           <a:noFill/>
-          <a:ln w="19050" cmpd="sng">
+          <a:ln w="12700" cmpd="sng">
             <a:solidFill>
               <a:srgbClr val="000000"/>
             </a:solidFill>
@@ -4071,6 +4028,9 @@
           <a:prstGeom prst="rect">
             <a:avLst/>
           </a:prstGeom>
+          <a:ln w="12700">
+            <a:noFill/>
+          </a:ln>
         </p:spPr>
         <p:txBody>
           <a:bodyPr wrap="square">
@@ -4107,7 +4067,7 @@
           <a:prstGeom prst="line">
             <a:avLst/>
           </a:prstGeom>
-          <a:ln>
+          <a:ln w="12700">
             <a:solidFill>
               <a:schemeClr val="bg1">
                 <a:lumMod val="50000"/>
@@ -4146,6 +4106,9 @@
           <a:prstGeom prst="rect">
             <a:avLst/>
           </a:prstGeom>
+          <a:ln w="12700">
+            <a:noFill/>
+          </a:ln>
         </p:spPr>
         <p:txBody>
           <a:bodyPr wrap="none">
@@ -4188,13 +4151,13 @@
         </p:nvCxnSpPr>
         <p:spPr>
           <a:xfrm>
-            <a:off x="3497661" y="2959093"/>
-            <a:ext cx="406848" cy="1710647"/>
+            <a:off x="3368280" y="2726623"/>
+            <a:ext cx="536229" cy="1943117"/>
           </a:xfrm>
           <a:prstGeom prst="straightConnector1">
             <a:avLst/>
           </a:prstGeom>
-          <a:ln w="28575" cmpd="sng">
+          <a:ln w="12700" cmpd="sng">
             <a:solidFill>
               <a:srgbClr val="7F7F7F"/>
             </a:solidFill>
@@ -4233,9 +4196,11 @@
             <a:avLst/>
           </a:prstGeom>
           <a:noFill/>
-          <a:ln w="19050" cmpd="sng">
+          <a:ln w="12700" cmpd="sng">
             <a:solidFill>
-              <a:srgbClr val="7F7F7F"/>
+              <a:schemeClr val="bg1">
+                <a:lumMod val="65000"/>
+              </a:schemeClr>
             </a:solidFill>
           </a:ln>
           <a:effectLst/>
@@ -4290,9 +4255,11 @@
             <a:avLst/>
           </a:prstGeom>
           <a:noFill/>
-          <a:ln w="19050" cmpd="sng">
+          <a:ln w="12700" cmpd="sng">
             <a:solidFill>
-              <a:srgbClr val="7F7F7F"/>
+              <a:schemeClr val="bg1">
+                <a:lumMod val="65000"/>
+              </a:schemeClr>
             </a:solidFill>
           </a:ln>
           <a:effectLst/>
@@ -4347,7 +4314,7 @@
             <a:avLst/>
           </a:prstGeom>
           <a:noFill/>
-          <a:ln w="19050" cmpd="sng">
+          <a:ln w="12700" cmpd="sng">
             <a:solidFill>
               <a:srgbClr val="000000"/>
             </a:solidFill>
@@ -4396,6 +4363,9 @@
           <a:prstGeom prst="rect">
             <a:avLst/>
           </a:prstGeom>
+          <a:ln w="12700">
+            <a:noFill/>
+          </a:ln>
         </p:spPr>
         <p:txBody>
           <a:bodyPr wrap="square">
@@ -4428,13 +4398,13 @@
         </p:nvCxnSpPr>
         <p:spPr>
           <a:xfrm>
-            <a:off x="6800792" y="2975833"/>
-            <a:ext cx="395621" cy="1696101"/>
+            <a:off x="6661173" y="2701344"/>
+            <a:ext cx="535240" cy="1970590"/>
           </a:xfrm>
           <a:prstGeom prst="straightConnector1">
             <a:avLst/>
           </a:prstGeom>
-          <a:ln w="28575" cmpd="sng">
+          <a:ln w="12700" cmpd="sng">
             <a:solidFill>
               <a:srgbClr val="7F7F7F"/>
             </a:solidFill>
@@ -4466,7 +4436,7 @@
         </p:nvSpPr>
         <p:spPr>
           <a:xfrm>
-            <a:off x="8237706" y="2350406"/>
+            <a:off x="7993155" y="2394611"/>
             <a:ext cx="150876" cy="137160"/>
           </a:xfrm>
           <a:prstGeom prst="ellipse">
@@ -4475,7 +4445,7 @@
           <a:solidFill>
             <a:schemeClr val="bg2"/>
           </a:solidFill>
-          <a:ln>
+          <a:ln w="12700">
             <a:solidFill>
               <a:srgbClr val="000000"/>
             </a:solidFill>
@@ -4512,7 +4482,7 @@
         </p:nvSpPr>
         <p:spPr>
           <a:xfrm>
-            <a:off x="8491581" y="2346006"/>
+            <a:off x="8247030" y="2390211"/>
             <a:ext cx="150876" cy="137160"/>
           </a:xfrm>
           <a:prstGeom prst="ellipse">
@@ -4521,7 +4491,7 @@
           <a:solidFill>
             <a:schemeClr val="bg2"/>
           </a:solidFill>
-          <a:ln>
+          <a:ln w="12700">
             <a:solidFill>
               <a:srgbClr val="000000"/>
             </a:solidFill>
@@ -4558,7 +4528,7 @@
         </p:nvSpPr>
         <p:spPr>
           <a:xfrm>
-            <a:off x="8741572" y="2350406"/>
+            <a:off x="8497021" y="2394611"/>
             <a:ext cx="150876" cy="137160"/>
           </a:xfrm>
           <a:prstGeom prst="ellipse">
@@ -4567,7 +4537,7 @@
           <a:solidFill>
             <a:schemeClr val="bg2"/>
           </a:solidFill>
-          <a:ln>
+          <a:ln w="12700">
             <a:solidFill>
               <a:srgbClr val="000000"/>
             </a:solidFill>
@@ -4607,13 +4577,13 @@
         </p:nvCxnSpPr>
         <p:spPr>
           <a:xfrm flipH="1">
-            <a:off x="3497661" y="1321934"/>
-            <a:ext cx="122869" cy="574738"/>
+            <a:off x="3368280" y="1520464"/>
+            <a:ext cx="472266" cy="707492"/>
           </a:xfrm>
           <a:prstGeom prst="straightConnector1">
             <a:avLst/>
           </a:prstGeom>
-          <a:ln w="28575" cmpd="sng">
+          <a:ln w="12700" cmpd="sng">
             <a:solidFill>
               <a:srgbClr val="7F7F7F"/>
             </a:solidFill>
@@ -4647,13 +4617,13 @@
         </p:nvCxnSpPr>
         <p:spPr>
           <a:xfrm>
-            <a:off x="4727770" y="1321934"/>
-            <a:ext cx="1665101" cy="508087"/>
+            <a:off x="4974335" y="1520464"/>
+            <a:ext cx="1288242" cy="668346"/>
           </a:xfrm>
           <a:prstGeom prst="straightConnector1">
             <a:avLst/>
           </a:prstGeom>
-          <a:ln w="28575" cmpd="sng">
+          <a:ln w="12700" cmpd="sng">
             <a:solidFill>
               <a:srgbClr val="7F7F7F"/>
             </a:solidFill>
@@ -4677,56 +4647,15 @@
           </a:fontRef>
         </p:style>
       </p:cxnSp>
-      <p:cxnSp>
-        <p:nvCxnSpPr>
-          <p:cNvPr id="193" name="Straight Arrow Connector 192"/>
-          <p:cNvCxnSpPr>
-            <a:cxnSpLocks/>
-            <a:endCxn id="70" idx="1"/>
-          </p:cNvCxnSpPr>
-          <p:nvPr/>
-        </p:nvCxnSpPr>
-        <p:spPr>
-          <a:xfrm flipV="1">
-            <a:off x="5545072" y="2444623"/>
-            <a:ext cx="388729" cy="12926"/>
-          </a:xfrm>
-          <a:prstGeom prst="straightConnector1">
-            <a:avLst/>
-          </a:prstGeom>
-          <a:ln w="28575" cmpd="sng">
-            <a:solidFill>
-              <a:srgbClr val="7F7F7F"/>
-            </a:solidFill>
-            <a:headEnd type="none"/>
-            <a:tailEnd type="triangle" w="lg" len="med"/>
-          </a:ln>
-          <a:effectLst/>
-        </p:spPr>
-        <p:style>
-          <a:lnRef idx="2">
-            <a:schemeClr val="accent1"/>
-          </a:lnRef>
-          <a:fillRef idx="0">
-            <a:schemeClr val="accent1"/>
-          </a:fillRef>
-          <a:effectRef idx="1">
-            <a:schemeClr val="accent1"/>
-          </a:effectRef>
-          <a:fontRef idx="minor">
-            <a:schemeClr val="tx1"/>
-          </a:fontRef>
-        </p:style>
-      </p:cxnSp>
-      <p:sp>
-        <p:nvSpPr>
-          <p:cNvPr id="200" name="Oval 199"/>
+      <p:sp>
+        <p:nvSpPr>
+          <p:cNvPr id="201" name="Oval 200"/>
           <p:cNvSpPr/>
           <p:nvPr/>
         </p:nvSpPr>
         <p:spPr>
           <a:xfrm>
-            <a:off x="4797322" y="2340245"/>
+            <a:off x="4912972" y="2380050"/>
             <a:ext cx="150876" cy="137160"/>
           </a:xfrm>
           <a:prstGeom prst="ellipse">
@@ -4735,7 +4664,7 @@
           <a:solidFill>
             <a:schemeClr val="bg2"/>
           </a:solidFill>
-          <a:ln>
+          <a:ln w="12700">
             <a:solidFill>
               <a:srgbClr val="000000"/>
             </a:solidFill>
@@ -4766,112 +4695,20 @@
       </p:sp>
       <p:sp>
         <p:nvSpPr>
-          <p:cNvPr id="201" name="Oval 200"/>
-          <p:cNvSpPr/>
-          <p:nvPr/>
-        </p:nvSpPr>
-        <p:spPr>
-          <a:xfrm>
-            <a:off x="5051197" y="2335845"/>
-            <a:ext cx="150876" cy="137160"/>
-          </a:xfrm>
-          <a:prstGeom prst="ellipse">
-            <a:avLst/>
-          </a:prstGeom>
-          <a:solidFill>
-            <a:schemeClr val="bg2"/>
-          </a:solidFill>
-          <a:ln>
-            <a:solidFill>
-              <a:srgbClr val="000000"/>
-            </a:solidFill>
-          </a:ln>
-        </p:spPr>
-        <p:style>
-          <a:lnRef idx="1">
-            <a:schemeClr val="accent1"/>
-          </a:lnRef>
-          <a:fillRef idx="3">
-            <a:schemeClr val="accent1"/>
-          </a:fillRef>
-          <a:effectRef idx="2">
-            <a:schemeClr val="accent1"/>
-          </a:effectRef>
-          <a:fontRef idx="minor">
-            <a:schemeClr val="lt1"/>
-          </a:fontRef>
-        </p:style>
-        <p:txBody>
-          <a:bodyPr rtlCol="0" anchor="ctr"/>
-          <a:lstStyle/>
-          <a:p>
-            <a:pPr algn="ctr"/>
-            <a:endParaRPr lang="en-US"/>
-          </a:p>
-        </p:txBody>
-      </p:sp>
-      <p:sp>
-        <p:nvSpPr>
-          <p:cNvPr id="202" name="Oval 201"/>
-          <p:cNvSpPr/>
-          <p:nvPr/>
-        </p:nvSpPr>
-        <p:spPr>
-          <a:xfrm>
-            <a:off x="5301188" y="2340245"/>
-            <a:ext cx="150876" cy="137160"/>
-          </a:xfrm>
-          <a:prstGeom prst="ellipse">
-            <a:avLst/>
-          </a:prstGeom>
-          <a:solidFill>
-            <a:schemeClr val="bg2"/>
-          </a:solidFill>
-          <a:ln>
-            <a:solidFill>
-              <a:srgbClr val="000000"/>
-            </a:solidFill>
-          </a:ln>
-        </p:spPr>
-        <p:style>
-          <a:lnRef idx="1">
-            <a:schemeClr val="accent1"/>
-          </a:lnRef>
-          <a:fillRef idx="3">
-            <a:schemeClr val="accent1"/>
-          </a:fillRef>
-          <a:effectRef idx="2">
-            <a:schemeClr val="accent1"/>
-          </a:effectRef>
-          <a:fontRef idx="minor">
-            <a:schemeClr val="lt1"/>
-          </a:fontRef>
-        </p:style>
-        <p:txBody>
-          <a:bodyPr rtlCol="0" anchor="ctr"/>
-          <a:lstStyle/>
-          <a:p>
-            <a:pPr algn="ctr"/>
-            <a:endParaRPr lang="en-US"/>
-          </a:p>
-        </p:txBody>
-      </p:sp>
-      <p:sp>
-        <p:nvSpPr>
           <p:cNvPr id="221" name="Rounded Rectangle 220"/>
           <p:cNvSpPr/>
           <p:nvPr/>
         </p:nvSpPr>
         <p:spPr>
           <a:xfrm>
-            <a:off x="10305259" y="445122"/>
-            <a:ext cx="1739126" cy="1302665"/>
+            <a:off x="10408631" y="435064"/>
+            <a:ext cx="1510473" cy="1302665"/>
           </a:xfrm>
           <a:prstGeom prst="roundRect">
             <a:avLst/>
           </a:prstGeom>
           <a:noFill/>
-          <a:ln w="19050" cmpd="sng">
+          <a:ln w="12700" cmpd="sng">
             <a:solidFill>
               <a:srgbClr val="000000"/>
             </a:solidFill>
@@ -4903,252 +4740,21 @@
                   <a:schemeClr val="tx1"/>
                 </a:solidFill>
               </a:rPr>
-              <a:t>global version (GV)</a:t>
+              <a:t>GV </a:t>
+            </a:r>
+            <a:r>
+              <a:rPr lang="en-US" sz="2400" dirty="0">
+                <a:solidFill>
+                  <a:schemeClr val="tx1"/>
+                </a:solidFill>
+              </a:rPr>
+              <a:t>(global version)</a:t>
             </a:r>
             <a:endParaRPr lang="en-US" sz="3600" dirty="0">
               <a:solidFill>
                 <a:schemeClr val="tx1"/>
               </a:solidFill>
             </a:endParaRPr>
-          </a:p>
-        </p:txBody>
-      </p:sp>
-      <p:graphicFrame>
-        <p:nvGraphicFramePr>
-          <p:cNvPr id="38" name="Table 37"/>
-          <p:cNvGraphicFramePr>
-            <a:graphicFrameLocks noGrp="1"/>
-          </p:cNvGraphicFramePr>
-          <p:nvPr>
-            <p:extLst>
-              <p:ext uri="{D42A27DB-BD31-4B8C-83A1-F6EECF244321}">
-                <p14:modId xmlns:p14="http://schemas.microsoft.com/office/powerpoint/2010/main" val="723944270"/>
-              </p:ext>
-            </p:extLst>
-          </p:nvPr>
-        </p:nvGraphicFramePr>
-        <p:xfrm>
-          <a:off x="8278699" y="3218584"/>
-          <a:ext cx="632587" cy="853451"/>
-        </p:xfrm>
-        <a:graphic>
-          <a:graphicData uri="http://schemas.openxmlformats.org/drawingml/2006/table">
-            <a:tbl>
-              <a:tblPr firstRow="1" bandRow="1">
-                <a:tableStyleId>{2D5ABB26-0587-4C30-8999-92F81FD0307C}</a:tableStyleId>
-              </a:tblPr>
-              <a:tblGrid>
-                <a:gridCol w="632587">
-                  <a:extLst>
-                    <a:ext uri="{9D8B030D-6E8A-4147-A177-3AD203B41FA5}">
-                      <a16:colId xmlns:a16="http://schemas.microsoft.com/office/drawing/2014/main" val="20000"/>
-                    </a:ext>
-                  </a:extLst>
-                </a:gridCol>
-              </a:tblGrid>
-              <a:tr h="276297">
-                <a:tc>
-                  <a:txBody>
-                    <a:bodyPr/>
-                    <a:lstStyle/>
-                    <a:p>
-                      <a:pPr algn="ctr"/>
-                      <a:endParaRPr lang="en-US" sz="1200" b="0" dirty="0"/>
-                    </a:p>
-                  </a:txBody>
-                  <a:tcPr marL="100584" marR="100584">
-                    <a:lnL w="12700" cap="flat" cmpd="sng" algn="ctr">
-                      <a:solidFill>
-                        <a:scrgbClr r="0" g="0" b="0"/>
-                      </a:solidFill>
-                      <a:prstDash val="solid"/>
-                      <a:round/>
-                      <a:headEnd type="none" w="med" len="med"/>
-                      <a:tailEnd type="none" w="med" len="med"/>
-                    </a:lnL>
-                    <a:lnR w="12700" cap="flat" cmpd="sng" algn="ctr">
-                      <a:solidFill>
-                        <a:scrgbClr r="0" g="0" b="0"/>
-                      </a:solidFill>
-                      <a:prstDash val="solid"/>
-                      <a:round/>
-                      <a:headEnd type="none" w="med" len="med"/>
-                      <a:tailEnd type="none" w="med" len="med"/>
-                    </a:lnR>
-                    <a:lnT w="12700" cap="flat" cmpd="sng" algn="ctr">
-                      <a:solidFill>
-                        <a:scrgbClr r="0" g="0" b="0"/>
-                      </a:solidFill>
-                      <a:prstDash val="solid"/>
-                      <a:round/>
-                      <a:headEnd type="none" w="med" len="med"/>
-                      <a:tailEnd type="none" w="med" len="med"/>
-                    </a:lnT>
-                    <a:lnB w="12700" cap="flat" cmpd="sng" algn="ctr">
-                      <a:solidFill>
-                        <a:scrgbClr r="0" g="0" b="0"/>
-                      </a:solidFill>
-                      <a:prstDash val="solid"/>
-                      <a:round/>
-                      <a:headEnd type="none" w="med" len="med"/>
-                      <a:tailEnd type="none" w="med" len="med"/>
-                    </a:lnB>
-                    <a:solidFill>
-                      <a:srgbClr val="FFFFFF"/>
-                    </a:solidFill>
-                  </a:tcPr>
-                </a:tc>
-                <a:extLst>
-                  <a:ext uri="{0D108BD9-81ED-4DB2-BD59-A6C34878D82A}">
-                    <a16:rowId xmlns:a16="http://schemas.microsoft.com/office/drawing/2014/main" val="10000"/>
-                  </a:ext>
-                </a:extLst>
-              </a:tr>
-              <a:tr h="288577">
-                <a:tc>
-                  <a:txBody>
-                    <a:bodyPr/>
-                    <a:lstStyle/>
-                    <a:p>
-                      <a:pPr algn="ctr"/>
-                      <a:endParaRPr lang="en-US" sz="1200" b="0" dirty="0"/>
-                    </a:p>
-                  </a:txBody>
-                  <a:tcPr marL="100584" marR="100584">
-                    <a:lnL w="12700" cap="flat" cmpd="sng" algn="ctr">
-                      <a:solidFill>
-                        <a:scrgbClr r="0" g="0" b="0"/>
-                      </a:solidFill>
-                      <a:prstDash val="solid"/>
-                      <a:round/>
-                      <a:headEnd type="none" w="med" len="med"/>
-                      <a:tailEnd type="none" w="med" len="med"/>
-                    </a:lnL>
-                    <a:lnR w="12700" cap="flat" cmpd="sng" algn="ctr">
-                      <a:solidFill>
-                        <a:scrgbClr r="0" g="0" b="0"/>
-                      </a:solidFill>
-                      <a:prstDash val="solid"/>
-                      <a:round/>
-                      <a:headEnd type="none" w="med" len="med"/>
-                      <a:tailEnd type="none" w="med" len="med"/>
-                    </a:lnR>
-                    <a:lnT w="12700" cap="flat" cmpd="sng" algn="ctr">
-                      <a:solidFill>
-                        <a:scrgbClr r="0" g="0" b="0"/>
-                      </a:solidFill>
-                      <a:prstDash val="solid"/>
-                      <a:round/>
-                      <a:headEnd type="none" w="med" len="med"/>
-                      <a:tailEnd type="none" w="med" len="med"/>
-                    </a:lnT>
-                    <a:lnB w="12700" cap="flat" cmpd="sng" algn="ctr">
-                      <a:solidFill>
-                        <a:scrgbClr r="0" g="0" b="0"/>
-                      </a:solidFill>
-                      <a:prstDash val="solid"/>
-                      <a:round/>
-                      <a:headEnd type="none" w="med" len="med"/>
-                      <a:tailEnd type="none" w="med" len="med"/>
-                    </a:lnB>
-                    <a:solidFill>
-                      <a:srgbClr val="FFFFFF"/>
-                    </a:solidFill>
-                  </a:tcPr>
-                </a:tc>
-                <a:extLst>
-                  <a:ext uri="{0D108BD9-81ED-4DB2-BD59-A6C34878D82A}">
-                    <a16:rowId xmlns:a16="http://schemas.microsoft.com/office/drawing/2014/main" val="10001"/>
-                  </a:ext>
-                </a:extLst>
-              </a:tr>
-              <a:tr h="288577">
-                <a:tc>
-                  <a:txBody>
-                    <a:bodyPr/>
-                    <a:lstStyle/>
-                    <a:p>
-                      <a:pPr algn="ctr"/>
-                      <a:endParaRPr lang="en-US" sz="1200" b="0" dirty="0"/>
-                    </a:p>
-                  </a:txBody>
-                  <a:tcPr marL="100584" marR="100584">
-                    <a:lnL w="12700" cap="flat" cmpd="sng" algn="ctr">
-                      <a:solidFill>
-                        <a:scrgbClr r="0" g="0" b="0"/>
-                      </a:solidFill>
-                      <a:prstDash val="solid"/>
-                      <a:round/>
-                      <a:headEnd type="none" w="med" len="med"/>
-                      <a:tailEnd type="none" w="med" len="med"/>
-                    </a:lnL>
-                    <a:lnR w="12700" cap="flat" cmpd="sng" algn="ctr">
-                      <a:solidFill>
-                        <a:scrgbClr r="0" g="0" b="0"/>
-                      </a:solidFill>
-                      <a:prstDash val="solid"/>
-                      <a:round/>
-                      <a:headEnd type="none" w="med" len="med"/>
-                      <a:tailEnd type="none" w="med" len="med"/>
-                    </a:lnR>
-                    <a:lnT w="12700" cap="flat" cmpd="sng" algn="ctr">
-                      <a:solidFill>
-                        <a:scrgbClr r="0" g="0" b="0"/>
-                      </a:solidFill>
-                      <a:prstDash val="solid"/>
-                      <a:round/>
-                      <a:headEnd type="none" w="med" len="med"/>
-                      <a:tailEnd type="none" w="med" len="med"/>
-                    </a:lnT>
-                    <a:lnB w="12700" cap="flat" cmpd="sng" algn="ctr">
-                      <a:solidFill>
-                        <a:scrgbClr r="0" g="0" b="0"/>
-                      </a:solidFill>
-                      <a:prstDash val="solid"/>
-                      <a:round/>
-                      <a:headEnd type="none" w="med" len="med"/>
-                      <a:tailEnd type="none" w="med" len="med"/>
-                    </a:lnB>
-                    <a:solidFill>
-                      <a:srgbClr val="FFFFFF"/>
-                    </a:solidFill>
-                  </a:tcPr>
-                </a:tc>
-                <a:extLst>
-                  <a:ext uri="{0D108BD9-81ED-4DB2-BD59-A6C34878D82A}">
-                    <a16:rowId xmlns:a16="http://schemas.microsoft.com/office/drawing/2014/main" val="10002"/>
-                  </a:ext>
-                </a:extLst>
-              </a:tr>
-            </a:tbl>
-          </a:graphicData>
-        </a:graphic>
-      </p:graphicFrame>
-      <p:sp>
-        <p:nvSpPr>
-          <p:cNvPr id="2" name="Rectangle 1"/>
-          <p:cNvSpPr/>
-          <p:nvPr/>
-        </p:nvSpPr>
-        <p:spPr>
-          <a:xfrm>
-            <a:off x="8158004" y="2768331"/>
-            <a:ext cx="763425" cy="523220"/>
-          </a:xfrm>
-          <a:prstGeom prst="rect">
-            <a:avLst/>
-          </a:prstGeom>
-        </p:spPr>
-        <p:txBody>
-          <a:bodyPr wrap="none">
-            <a:spAutoFit/>
-          </a:bodyPr>
-          <a:lstStyle/>
-          <a:p>
-            <a:r>
-              <a:rPr lang="en-US" sz="2800" dirty="0"/>
-              <a:t>PPA</a:t>
-            </a:r>
           </a:p>
         </p:txBody>
       </p:sp>
@@ -5173,7 +4779,7 @@
             <a:avLst/>
           </a:prstGeom>
           <a:noFill/>
-          <a:ln w="19050" cmpd="sng">
+          <a:ln w="12700" cmpd="sng">
             <a:solidFill>
               <a:srgbClr val="000000"/>
             </a:solidFill>
@@ -5232,6 +4838,9 @@
             <a:avLst/>
           </a:prstGeom>
           <a:noFill/>
+          <a:ln w="12700">
+            <a:noFill/>
+          </a:ln>
         </p:spPr>
         <p:txBody>
           <a:bodyPr wrap="square" rtlCol="0">
@@ -5971,6 +5580,9 @@
             <a:avLst/>
           </a:prstGeom>
           <a:noFill/>
+          <a:ln w="12700">
+            <a:noFill/>
+          </a:ln>
         </p:spPr>
         <p:txBody>
           <a:bodyPr wrap="square" rtlCol="0">
@@ -5999,14 +5611,74 @@
         </p:nvSpPr>
         <p:spPr>
           <a:xfrm>
-            <a:off x="2716383" y="2466491"/>
-            <a:ext cx="1124163" cy="401935"/>
+            <a:off x="4172022" y="2876847"/>
+            <a:ext cx="1475220" cy="910667"/>
           </a:xfrm>
           <a:prstGeom prst="roundRect">
             <a:avLst/>
           </a:prstGeom>
           <a:noFill/>
-          <a:ln w="19050" cmpd="sng">
+          <a:ln w="12700" cmpd="sng">
+            <a:solidFill>
+              <a:schemeClr val="bg1">
+                <a:lumMod val="65000"/>
+              </a:schemeClr>
+            </a:solidFill>
+          </a:ln>
+          <a:effectLst/>
+        </p:spPr>
+        <p:style>
+          <a:lnRef idx="1">
+            <a:schemeClr val="accent1"/>
+          </a:lnRef>
+          <a:fillRef idx="3">
+            <a:schemeClr val="accent1"/>
+          </a:fillRef>
+          <a:effectRef idx="2">
+            <a:schemeClr val="accent1"/>
+          </a:effectRef>
+          <a:fontRef idx="minor">
+            <a:schemeClr val="lt1"/>
+          </a:fontRef>
+        </p:style>
+        <p:txBody>
+          <a:bodyPr lIns="182880" tIns="0" rIns="182880" bIns="91440" rtlCol="0" anchor="ctr" anchorCtr="1"/>
+          <a:lstStyle/>
+          <a:p>
+            <a:pPr algn="ctr"/>
+            <a:r>
+              <a:rPr lang="en-US" sz="2800" dirty="0">
+                <a:solidFill>
+                  <a:schemeClr val="tx1"/>
+                </a:solidFill>
+              </a:rPr>
+              <a:t>Bloom filter</a:t>
+            </a:r>
+          </a:p>
+        </p:txBody>
+      </p:sp>
+      <p:sp>
+        <p:nvSpPr>
+          <p:cNvPr id="70" name="Rounded Rectangle 69">
+            <a:extLst>
+              <a:ext uri="{FF2B5EF4-FFF2-40B4-BE49-F238E27FC236}">
+                <a16:creationId xmlns:a16="http://schemas.microsoft.com/office/drawing/2014/main" id="{4AC52F38-4CC8-8C48-BFE4-D4FD5CB25AEB}"/>
+              </a:ext>
+            </a:extLst>
+          </p:cNvPr>
+          <p:cNvSpPr/>
+          <p:nvPr/>
+        </p:nvSpPr>
+        <p:spPr>
+          <a:xfrm>
+            <a:off x="5913053" y="2202677"/>
+            <a:ext cx="1496240" cy="498667"/>
+          </a:xfrm>
+          <a:prstGeom prst="roundRect">
+            <a:avLst/>
+          </a:prstGeom>
+          <a:noFill/>
+          <a:ln w="12700" cmpd="sng">
             <a:solidFill>
               <a:srgbClr val="000000"/>
             </a:solidFill>
@@ -6028,27 +5700,27 @@
           </a:fontRef>
         </p:style>
         <p:txBody>
-          <a:bodyPr lIns="182880" tIns="0" rIns="182880" bIns="91440" rtlCol="0" anchor="ctr" anchorCtr="1"/>
+          <a:bodyPr lIns="182880" tIns="0" rIns="182880" bIns="91440" rtlCol="0" anchor="t" anchorCtr="0"/>
           <a:lstStyle/>
           <a:p>
             <a:pPr algn="ctr"/>
             <a:r>
-              <a:rPr lang="en-US" sz="2800" dirty="0">
+              <a:rPr lang="en-US" sz="3200" dirty="0">
                 <a:solidFill>
                   <a:schemeClr val="tx1"/>
                 </a:solidFill>
               </a:rPr>
-              <a:t>filter</a:t>
+              <a:t>chunk</a:t>
             </a:r>
           </a:p>
         </p:txBody>
       </p:sp>
       <p:sp>
         <p:nvSpPr>
-          <p:cNvPr id="70" name="Rounded Rectangle 69">
+          <p:cNvPr id="48" name="Oval 47">
             <a:extLst>
               <a:ext uri="{FF2B5EF4-FFF2-40B4-BE49-F238E27FC236}">
-                <a16:creationId xmlns:a16="http://schemas.microsoft.com/office/drawing/2014/main" id="{4AC52F38-4CC8-8C48-BFE4-D4FD5CB25AEB}"/>
+                <a16:creationId xmlns:a16="http://schemas.microsoft.com/office/drawing/2014/main" id="{C4819FDB-F2A8-5D41-A447-7B8F278619ED}"/>
               </a:ext>
             </a:extLst>
           </p:cNvPr>
@@ -6057,19 +5729,20 @@
         </p:nvSpPr>
         <p:spPr>
           <a:xfrm>
-            <a:off x="5933801" y="1913412"/>
-            <a:ext cx="1733982" cy="1062421"/>
+            <a:off x="4685234" y="2378340"/>
+            <a:ext cx="150876" cy="137160"/>
           </a:xfrm>
-          <a:prstGeom prst="roundRect">
+          <a:prstGeom prst="ellipse">
             <a:avLst/>
           </a:prstGeom>
-          <a:noFill/>
-          <a:ln w="19050" cmpd="sng">
+          <a:solidFill>
+            <a:schemeClr val="bg2"/>
+          </a:solidFill>
+          <a:ln w="12700">
             <a:solidFill>
               <a:srgbClr val="000000"/>
             </a:solidFill>
           </a:ln>
-          <a:effectLst/>
         </p:spPr>
         <p:style>
           <a:lnRef idx="1">
@@ -6086,27 +5759,20 @@
           </a:fontRef>
         </p:style>
         <p:txBody>
-          <a:bodyPr lIns="182880" tIns="0" rIns="182880" bIns="91440" rtlCol="0" anchor="t" anchorCtr="0"/>
+          <a:bodyPr rtlCol="0" anchor="ctr"/>
           <a:lstStyle/>
           <a:p>
             <a:pPr algn="ctr"/>
-            <a:r>
-              <a:rPr lang="en-US" sz="3200" dirty="0">
-                <a:solidFill>
-                  <a:schemeClr val="tx1"/>
-                </a:solidFill>
-              </a:rPr>
-              <a:t>chunk</a:t>
-            </a:r>
-          </a:p>
-        </p:txBody>
-      </p:sp>
-      <p:sp>
-        <p:nvSpPr>
-          <p:cNvPr id="71" name="Rounded Rectangle 70">
+            <a:endParaRPr lang="en-US"/>
+          </a:p>
+        </p:txBody>
+      </p:sp>
+      <p:sp>
+        <p:nvSpPr>
+          <p:cNvPr id="49" name="Oval 48">
             <a:extLst>
               <a:ext uri="{FF2B5EF4-FFF2-40B4-BE49-F238E27FC236}">
-                <a16:creationId xmlns:a16="http://schemas.microsoft.com/office/drawing/2014/main" id="{DDED4A63-28CA-204B-A3DC-FAB688086288}"/>
+                <a16:creationId xmlns:a16="http://schemas.microsoft.com/office/drawing/2014/main" id="{EF8E4037-3EEE-854F-A4BA-5357137D330A}"/>
               </a:ext>
             </a:extLst>
           </p:cNvPr>
@@ -6115,19 +5781,20 @@
         </p:nvSpPr>
         <p:spPr>
           <a:xfrm>
-            <a:off x="6007240" y="2444623"/>
-            <a:ext cx="1124163" cy="401935"/>
+            <a:off x="5157839" y="2378229"/>
+            <a:ext cx="150876" cy="137160"/>
           </a:xfrm>
-          <a:prstGeom prst="roundRect">
+          <a:prstGeom prst="ellipse">
             <a:avLst/>
           </a:prstGeom>
-          <a:noFill/>
-          <a:ln w="19050" cmpd="sng">
+          <a:solidFill>
+            <a:schemeClr val="bg2"/>
+          </a:solidFill>
+          <a:ln w="12700">
             <a:solidFill>
               <a:srgbClr val="000000"/>
             </a:solidFill>
           </a:ln>
-          <a:effectLst/>
         </p:spPr>
         <p:style>
           <a:lnRef idx="1">
@@ -6144,21 +5811,108 @@
           </a:fontRef>
         </p:style>
         <p:txBody>
-          <a:bodyPr lIns="182880" tIns="0" rIns="182880" bIns="91440" rtlCol="0" anchor="ctr" anchorCtr="1"/>
+          <a:bodyPr rtlCol="0" anchor="ctr"/>
           <a:lstStyle/>
           <a:p>
             <a:pPr algn="ctr"/>
-            <a:r>
-              <a:rPr lang="en-US" sz="2800" dirty="0">
-                <a:solidFill>
-                  <a:schemeClr val="tx1"/>
-                </a:solidFill>
-              </a:rPr>
-              <a:t>filter</a:t>
-            </a:r>
-          </a:p>
-        </p:txBody>
-      </p:sp>
+            <a:endParaRPr lang="en-US"/>
+          </a:p>
+        </p:txBody>
+      </p:sp>
+      <p:cxnSp>
+        <p:nvCxnSpPr>
+          <p:cNvPr id="50" name="Straight Arrow Connector 49">
+            <a:extLst>
+              <a:ext uri="{FF2B5EF4-FFF2-40B4-BE49-F238E27FC236}">
+                <a16:creationId xmlns:a16="http://schemas.microsoft.com/office/drawing/2014/main" id="{A407AAB8-B780-CC49-9B4E-2E9987769C2B}"/>
+              </a:ext>
+            </a:extLst>
+          </p:cNvPr>
+          <p:cNvCxnSpPr>
+            <a:cxnSpLocks/>
+            <a:endCxn id="70" idx="1"/>
+          </p:cNvCxnSpPr>
+          <p:nvPr/>
+        </p:nvCxnSpPr>
+        <p:spPr>
+          <a:xfrm flipV="1">
+            <a:off x="5415454" y="2452011"/>
+            <a:ext cx="497599" cy="5045"/>
+          </a:xfrm>
+          <a:prstGeom prst="straightConnector1">
+            <a:avLst/>
+          </a:prstGeom>
+          <a:ln w="12700" cmpd="sng">
+            <a:solidFill>
+              <a:srgbClr val="7F7F7F"/>
+            </a:solidFill>
+            <a:headEnd type="none"/>
+            <a:tailEnd type="triangle" w="lg" len="med"/>
+          </a:ln>
+          <a:effectLst/>
+        </p:spPr>
+        <p:style>
+          <a:lnRef idx="2">
+            <a:schemeClr val="accent1"/>
+          </a:lnRef>
+          <a:fillRef idx="0">
+            <a:schemeClr val="accent1"/>
+          </a:fillRef>
+          <a:effectRef idx="1">
+            <a:schemeClr val="accent1"/>
+          </a:effectRef>
+          <a:fontRef idx="minor">
+            <a:schemeClr val="tx1"/>
+          </a:fontRef>
+        </p:style>
+      </p:cxnSp>
+      <p:cxnSp>
+        <p:nvCxnSpPr>
+          <p:cNvPr id="52" name="Straight Arrow Connector 51">
+            <a:extLst>
+              <a:ext uri="{FF2B5EF4-FFF2-40B4-BE49-F238E27FC236}">
+                <a16:creationId xmlns:a16="http://schemas.microsoft.com/office/drawing/2014/main" id="{014D7A82-137D-6241-8F23-CB185525D3F0}"/>
+              </a:ext>
+            </a:extLst>
+          </p:cNvPr>
+          <p:cNvCxnSpPr>
+            <a:cxnSpLocks/>
+            <a:endCxn id="51" idx="1"/>
+          </p:cNvCxnSpPr>
+          <p:nvPr/>
+        </p:nvCxnSpPr>
+        <p:spPr>
+          <a:xfrm>
+            <a:off x="3726846" y="2736274"/>
+            <a:ext cx="445176" cy="595907"/>
+          </a:xfrm>
+          <a:prstGeom prst="straightConnector1">
+            <a:avLst/>
+          </a:prstGeom>
+          <a:ln w="12700" cmpd="sng">
+            <a:solidFill>
+              <a:srgbClr val="7F7F7F"/>
+            </a:solidFill>
+            <a:headEnd type="none"/>
+            <a:tailEnd type="triangle" w="lg" len="med"/>
+          </a:ln>
+          <a:effectLst/>
+        </p:spPr>
+        <p:style>
+          <a:lnRef idx="2">
+            <a:schemeClr val="accent1"/>
+          </a:lnRef>
+          <a:fillRef idx="0">
+            <a:schemeClr val="accent1"/>
+          </a:fillRef>
+          <a:effectRef idx="1">
+            <a:schemeClr val="accent1"/>
+          </a:effectRef>
+          <a:fontRef idx="minor">
+            <a:schemeClr val="tx1"/>
+          </a:fontRef>
+        </p:style>
+      </p:cxnSp>
     </p:spTree>
     <p:extLst>
       <p:ext uri="{BB962C8B-B14F-4D97-AF65-F5344CB8AC3E}">

</xml_diff>